<commit_message>
Add comment about the challenge 1 feedback
</commit_message>
<xml_diff>
--- a/Presentation for Elena.pptx
+++ b/Presentation for Elena.pptx
@@ -279,7 +279,7 @@
             <a:fld id="{17A39E9D-B438-D94D-AF2A-93757548558C}" type="datetime1">
               <a:rPr lang="nl-NL" altLang="nl-NL"/>
               <a:pPr/>
-              <a:t>20-04-2020</a:t>
+              <a:t>21-04-2020</a:t>
             </a:fld>
             <a:endParaRPr lang="nl-NL" altLang="nl-NL"/>
           </a:p>
@@ -491,7 +491,7 @@
             <a:fld id="{3AA95554-0BC3-EC48-BCE0-DB850053191D}" type="datetime1">
               <a:rPr lang="nl-NL" altLang="nl-NL"/>
               <a:pPr/>
-              <a:t>20-04-2020</a:t>
+              <a:t>21-04-2020</a:t>
             </a:fld>
             <a:endParaRPr lang="nl-NL" altLang="nl-NL"/>
           </a:p>
@@ -1013,7 +1013,7 @@
           <a:p>
             <a:fld id="{9E1ED08B-741D-9E48-95DA-82644AB503BC}" type="datetime1">
               <a:rPr lang="nl-NL" altLang="nl-NL" smtClean="0"/>
-              <a:t>20-04-2020</a:t>
+              <a:t>21-04-2020</a:t>
             </a:fld>
             <a:endParaRPr lang="nl-NL" altLang="nl-NL"/>
           </a:p>
@@ -1277,7 +1277,7 @@
           <a:p>
             <a:fld id="{46CB0545-8C00-A544-A88F-C33FBC7A7630}" type="datetime1">
               <a:rPr lang="nl-NL" altLang="nl-NL" smtClean="0"/>
-              <a:t>20-04-2020</a:t>
+              <a:t>21-04-2020</a:t>
             </a:fld>
             <a:endParaRPr lang="nl-NL" altLang="nl-NL" dirty="0"/>
           </a:p>
@@ -1537,7 +1537,7 @@
               </a14:hiddenLine>
             </a:ext>
             <a:ext uri="{FAA26D3D-D897-4be2-8F04-BA451C77F1D7}">
-              <ma14:placeholderFlag xmlns="" xmlns:ma14="http://schemas.microsoft.com/office/mac/drawingml/2011/main" val="1"/>
+              <ma14:placeholderFlag xmlns:ma14="http://schemas.microsoft.com/office/mac/drawingml/2011/main" xmlns="" val="1"/>
             </a:ext>
           </a:extLst>
         </p:spPr>
@@ -1598,7 +1598,7 @@
               </a14:hiddenLine>
             </a:ext>
             <a:ext uri="{FAA26D3D-D897-4be2-8F04-BA451C77F1D7}">
-              <ma14:placeholderFlag xmlns="" xmlns:ma14="http://schemas.microsoft.com/office/mac/drawingml/2011/main" val="1"/>
+              <ma14:placeholderFlag xmlns:ma14="http://schemas.microsoft.com/office/mac/drawingml/2011/main" xmlns="" val="1"/>
             </a:ext>
           </a:extLst>
         </p:spPr>
@@ -1777,7 +1777,7 @@
             <a:fld id="{B3873A8C-A209-FC40-86BC-D3E9A671FD81}" type="datetime1">
               <a:rPr lang="nl-NL" altLang="nl-NL" smtClean="0"/>
               <a:pPr/>
-              <a:t>20-04-2020</a:t>
+              <a:t>21-04-2020</a:t>
             </a:fld>
             <a:endParaRPr lang="nl-NL" altLang="nl-NL" dirty="0"/>
           </a:p>
@@ -2267,7 +2267,7 @@
               </a14:hiddenLine>
             </a:ext>
             <a:ext uri="{FAA26D3D-D897-4be2-8F04-BA451C77F1D7}">
-              <ma14:placeholderFlag xmlns="" xmlns:ma14="http://schemas.microsoft.com/office/mac/drawingml/2011/main" val="1"/>
+              <ma14:placeholderFlag xmlns:ma14="http://schemas.microsoft.com/office/mac/drawingml/2011/main" xmlns="" val="1"/>
             </a:ext>
           </a:extLst>
         </p:spPr>
@@ -2328,7 +2328,7 @@
               </a14:hiddenLine>
             </a:ext>
             <a:ext uri="{FAA26D3D-D897-4be2-8F04-BA451C77F1D7}">
-              <ma14:placeholderFlag xmlns="" xmlns:ma14="http://schemas.microsoft.com/office/mac/drawingml/2011/main" val="1"/>
+              <ma14:placeholderFlag xmlns:ma14="http://schemas.microsoft.com/office/mac/drawingml/2011/main" xmlns="" val="1"/>
             </a:ext>
           </a:extLst>
         </p:spPr>
@@ -2509,7 +2509,7 @@
             <a:fld id="{FB5CF2AB-20FF-5442-9E53-3C6EDD7FBCEA}" type="datetime1">
               <a:rPr lang="nl-NL" altLang="nl-NL" smtClean="0"/>
               <a:pPr/>
-              <a:t>20-04-2020</a:t>
+              <a:t>21-04-2020</a:t>
             </a:fld>
             <a:endParaRPr lang="nl-NL" altLang="nl-NL" dirty="0"/>
           </a:p>
@@ -2997,335 +2997,6 @@
               <a:t>used</a:t>
             </a:r>
             <a:endParaRPr lang="nl-NL" dirty="0"/>
-          </a:p>
-        </p:txBody>
-      </p:sp>
-      <p:sp>
-        <p:nvSpPr>
-          <p:cNvPr id="5" name="Tijdelijke aanduiding voor inhoud 4"/>
-          <p:cNvSpPr>
-            <a:spLocks noGrp="1"/>
-          </p:cNvSpPr>
-          <p:nvPr>
-            <p:ph idx="1"/>
-          </p:nvPr>
-        </p:nvSpPr>
-        <p:spPr>
-          <a:xfrm>
-            <a:off x="324466" y="929148"/>
-            <a:ext cx="15323573" cy="3923071"/>
-          </a:xfrm>
-        </p:spPr>
-        <p:txBody>
-          <a:bodyPr>
-            <a:normAutofit lnSpcReduction="10000"/>
-          </a:bodyPr>
-          <a:lstStyle/>
-          <a:p>
-            <a:r>
-              <a:rPr lang="nl-NL" sz="2200" dirty="0" err="1"/>
-              <a:t>Our</a:t>
-            </a:r>
-            <a:r>
-              <a:rPr lang="nl-NL" sz="2200" dirty="0"/>
-              <a:t> team name on </a:t>
-            </a:r>
-            <a:r>
-              <a:rPr lang="nl-NL" sz="2200" dirty="0" err="1"/>
-              <a:t>Kaggle</a:t>
-            </a:r>
-            <a:r>
-              <a:rPr lang="nl-NL" sz="2200" dirty="0"/>
-              <a:t> is </a:t>
-            </a:r>
-            <a:r>
-              <a:rPr lang="nl-NL" sz="2200" dirty="0" err="1"/>
-              <a:t>MLiP_Badger</a:t>
-            </a:r>
-            <a:endParaRPr lang="nl-NL" sz="2200" dirty="0"/>
-          </a:p>
-          <a:p>
-            <a:r>
-              <a:rPr lang="nl-NL" sz="2200" dirty="0"/>
-              <a:t>We made </a:t>
-            </a:r>
-            <a:r>
-              <a:rPr lang="nl-NL" sz="2200" dirty="0" err="1"/>
-              <a:t>one</a:t>
-            </a:r>
-            <a:r>
-              <a:rPr lang="nl-NL" sz="2200" dirty="0"/>
-              <a:t> </a:t>
-            </a:r>
-            <a:r>
-              <a:rPr lang="nl-NL" sz="2200" dirty="0" err="1"/>
-              <a:t>submissio</a:t>
-            </a:r>
-            <a:r>
-              <a:rPr lang="nl-NL" sz="2400" dirty="0" err="1"/>
-              <a:t>n</a:t>
-            </a:r>
-            <a:r>
-              <a:rPr lang="nl-NL" sz="2400" dirty="0"/>
-              <a:t> </a:t>
-            </a:r>
-            <a:r>
-              <a:rPr lang="nl-NL" sz="2400" dirty="0" err="1"/>
-              <a:t>with</a:t>
-            </a:r>
-            <a:r>
-              <a:rPr lang="nl-NL" sz="2400" dirty="0"/>
-              <a:t> </a:t>
-            </a:r>
-            <a:r>
-              <a:rPr lang="nl-NL" sz="2400" dirty="0" err="1"/>
-              <a:t>the</a:t>
-            </a:r>
-            <a:r>
-              <a:rPr lang="nl-NL" sz="2400" dirty="0"/>
-              <a:t> </a:t>
-            </a:r>
-            <a:r>
-              <a:rPr lang="nl-NL" sz="2400" dirty="0" err="1"/>
-              <a:t>predition</a:t>
-            </a:r>
-            <a:r>
-              <a:rPr lang="nl-NL" sz="2400" dirty="0"/>
-              <a:t> made </a:t>
-            </a:r>
-            <a:r>
-              <a:rPr lang="nl-NL" sz="2400" dirty="0" err="1"/>
-              <a:t>with</a:t>
-            </a:r>
-            <a:r>
-              <a:rPr lang="nl-NL" sz="2400" dirty="0"/>
-              <a:t> ARIMA model. We </a:t>
-            </a:r>
-            <a:r>
-              <a:rPr lang="nl-NL" sz="2400" dirty="0" err="1"/>
-              <a:t>used</a:t>
-            </a:r>
-            <a:r>
-              <a:rPr lang="nl-NL" sz="2400" dirty="0"/>
-              <a:t> </a:t>
-            </a:r>
-            <a:r>
-              <a:rPr lang="nl-NL" sz="2400" dirty="0" err="1"/>
-              <a:t>implementation</a:t>
-            </a:r>
-            <a:r>
-              <a:rPr lang="nl-NL" sz="2400" dirty="0"/>
-              <a:t> </a:t>
-            </a:r>
-            <a:r>
-              <a:rPr lang="nl-NL" sz="2400" dirty="0" err="1"/>
-              <a:t>from</a:t>
-            </a:r>
-            <a:r>
-              <a:rPr lang="nl-NL" sz="2400" dirty="0"/>
-              <a:t> </a:t>
-            </a:r>
-            <a:r>
-              <a:rPr lang="en-US" sz="2400" dirty="0">
-                <a:hlinkClick r:id="rId2"/>
-              </a:rPr>
-              <a:t>statsmodels</a:t>
-            </a:r>
-            <a:r>
-              <a:rPr lang="en-US" sz="2400" dirty="0"/>
-              <a:t> Python module – SARIMAX function</a:t>
-            </a:r>
-            <a:endParaRPr lang="nl-NL" sz="2400" dirty="0"/>
-          </a:p>
-          <a:p>
-            <a:r>
-              <a:rPr lang="nl-NL" sz="2200" dirty="0"/>
-              <a:t>We </a:t>
-            </a:r>
-            <a:r>
-              <a:rPr lang="nl-NL" sz="2200" dirty="0" err="1"/>
-              <a:t>decided</a:t>
-            </a:r>
-            <a:r>
-              <a:rPr lang="nl-NL" sz="2200" dirty="0"/>
-              <a:t> </a:t>
-            </a:r>
-            <a:r>
-              <a:rPr lang="nl-NL" sz="2200" dirty="0" err="1"/>
-              <a:t>to</a:t>
-            </a:r>
-            <a:r>
-              <a:rPr lang="nl-NL" sz="2200" dirty="0"/>
-              <a:t> experiment </a:t>
-            </a:r>
-            <a:r>
-              <a:rPr lang="nl-NL" sz="2200" dirty="0" err="1"/>
-              <a:t>with</a:t>
-            </a:r>
-            <a:r>
-              <a:rPr lang="nl-NL" sz="2200" dirty="0"/>
-              <a:t> </a:t>
-            </a:r>
-            <a:r>
-              <a:rPr lang="nl-NL" sz="2200" dirty="0" err="1"/>
-              <a:t>this</a:t>
-            </a:r>
-            <a:r>
-              <a:rPr lang="nl-NL" sz="2200" dirty="0"/>
-              <a:t> model </a:t>
-            </a:r>
-            <a:r>
-              <a:rPr lang="nl-NL" sz="2200" dirty="0" err="1"/>
-              <a:t>because</a:t>
-            </a:r>
-            <a:r>
-              <a:rPr lang="nl-NL" sz="2200" dirty="0"/>
-              <a:t> (</a:t>
-            </a:r>
-            <a:r>
-              <a:rPr lang="nl-NL" sz="2200" dirty="0" err="1"/>
-              <a:t>why</a:t>
-            </a:r>
-            <a:r>
-              <a:rPr lang="nl-NL" sz="2200" dirty="0"/>
-              <a:t>? As far as I </a:t>
-            </a:r>
-            <a:r>
-              <a:rPr lang="nl-NL" sz="2200" dirty="0" err="1"/>
-              <a:t>can</a:t>
-            </a:r>
-            <a:r>
-              <a:rPr lang="nl-NL" sz="2200" dirty="0"/>
-              <a:t> </a:t>
-            </a:r>
-            <a:r>
-              <a:rPr lang="nl-NL" sz="2200" dirty="0" err="1"/>
-              <a:t>see</a:t>
-            </a:r>
-            <a:r>
-              <a:rPr lang="nl-NL" sz="2200" dirty="0"/>
-              <a:t> </a:t>
-            </a:r>
-            <a:r>
-              <a:rPr lang="nl-NL" sz="2200" dirty="0" err="1"/>
-              <a:t>now</a:t>
-            </a:r>
-            <a:r>
-              <a:rPr lang="nl-NL" sz="2200" dirty="0"/>
-              <a:t> </a:t>
-            </a:r>
-            <a:r>
-              <a:rPr lang="nl-NL" sz="2200" dirty="0" err="1"/>
-              <a:t>the</a:t>
-            </a:r>
-            <a:r>
-              <a:rPr lang="nl-NL" sz="2200" dirty="0"/>
-              <a:t> </a:t>
-            </a:r>
-            <a:r>
-              <a:rPr lang="nl-NL" sz="2200" dirty="0" err="1"/>
-              <a:t>used</a:t>
-            </a:r>
-            <a:r>
-              <a:rPr lang="nl-NL" sz="2200" dirty="0"/>
-              <a:t> </a:t>
-            </a:r>
-            <a:r>
-              <a:rPr lang="nl-NL" sz="2200" dirty="0" err="1"/>
-              <a:t>implementation</a:t>
-            </a:r>
-            <a:r>
-              <a:rPr lang="nl-NL" sz="2200" dirty="0"/>
-              <a:t> </a:t>
-            </a:r>
-            <a:r>
-              <a:rPr lang="nl-NL" sz="2200" dirty="0" err="1"/>
-              <a:t>allows</a:t>
-            </a:r>
-            <a:r>
-              <a:rPr lang="nl-NL" sz="2200" dirty="0"/>
-              <a:t> </a:t>
-            </a:r>
-            <a:r>
-              <a:rPr lang="nl-NL" sz="2200" dirty="0" err="1"/>
-              <a:t>to</a:t>
-            </a:r>
-            <a:r>
-              <a:rPr lang="nl-NL" sz="2200" dirty="0"/>
-              <a:t> </a:t>
-            </a:r>
-            <a:r>
-              <a:rPr lang="nl-NL" sz="2200" dirty="0" err="1"/>
-              <a:t>try</a:t>
-            </a:r>
-            <a:r>
-              <a:rPr lang="nl-NL" sz="2200" dirty="0"/>
-              <a:t> different options: ARIMA, ARIMAX, SARIMAX, </a:t>
-            </a:r>
-            <a:r>
-              <a:rPr lang="nl-NL" sz="2200" dirty="0" err="1"/>
-              <a:t>this</a:t>
-            </a:r>
-            <a:r>
-              <a:rPr lang="nl-NL" sz="2200" dirty="0"/>
-              <a:t> </a:t>
-            </a:r>
-            <a:r>
-              <a:rPr lang="nl-NL" sz="2200" dirty="0" err="1"/>
-              <a:t>could</a:t>
-            </a:r>
-            <a:r>
-              <a:rPr lang="nl-NL" sz="2200" dirty="0"/>
-              <a:t> </a:t>
-            </a:r>
-            <a:r>
-              <a:rPr lang="nl-NL" sz="2200" dirty="0" err="1"/>
-              <a:t>be</a:t>
-            </a:r>
-            <a:r>
-              <a:rPr lang="nl-NL" sz="2200" dirty="0"/>
-              <a:t> </a:t>
-            </a:r>
-            <a:r>
-              <a:rPr lang="nl-NL" sz="2200" dirty="0" err="1"/>
-              <a:t>an</a:t>
-            </a:r>
-            <a:r>
-              <a:rPr lang="nl-NL" sz="2200" dirty="0"/>
-              <a:t> argument)</a:t>
-            </a:r>
-          </a:p>
-          <a:p>
-            <a:r>
-              <a:rPr lang="ru-RU" sz="2200" dirty="0"/>
-              <a:t>70 (?) </a:t>
-            </a:r>
-            <a:r>
-              <a:rPr lang="en-US" sz="2200" dirty="0"/>
-              <a:t>last samples are used as training data</a:t>
-            </a:r>
-          </a:p>
-          <a:p>
-            <a:r>
-              <a:rPr lang="nl-NL" sz="2200" dirty="0"/>
-              <a:t>Public score </a:t>
-            </a:r>
-            <a:r>
-              <a:rPr lang="ru-RU" sz="2200" dirty="0"/>
-              <a:t>1.08216</a:t>
-            </a:r>
-            <a:endParaRPr lang="en-US" sz="2200" dirty="0"/>
-          </a:p>
-          <a:p>
-            <a:r>
-              <a:rPr lang="en-US" sz="2200" dirty="0"/>
-              <a:t>This helped to figure our how default Kaggle submission works (not from a notebook). Submission was made via Kaggle </a:t>
-            </a:r>
-            <a:r>
-              <a:rPr lang="en-US" sz="2200" dirty="0" err="1"/>
-              <a:t>api</a:t>
-            </a:r>
-            <a:endParaRPr lang="nl-NL" sz="2200" dirty="0"/>
           </a:p>
         </p:txBody>
       </p:sp>
@@ -3374,7 +3045,7 @@
               </a14:hiddenLine>
             </a:ext>
             <a:ext uri="{FAA26D3D-D897-4be2-8F04-BA451C77F1D7}">
-              <ma14:placeholderFlag xmlns="" xmlns:ma14="http://schemas.microsoft.com/office/mac/drawingml/2011/main" val="1"/>
+              <ma14:placeholderFlag xmlns:ma14="http://schemas.microsoft.com/office/mac/drawingml/2011/main" xmlns="" val="1"/>
             </a:ext>
           </a:extLst>
         </p:spPr>
@@ -3610,6 +3281,397 @@
               <a:t>In the feedback for the previous challenge report it was said that the passed code could be documented better. From our point of view the comments were rather detailed. Can we get more specific requirements of how the code should be documented?</a:t>
             </a:r>
             <a:endParaRPr lang="ru-RU" sz="2200" dirty="0">
+              <a:latin typeface="+mn-lt"/>
+            </a:endParaRPr>
+          </a:p>
+        </p:txBody>
+      </p:sp>
+      <p:sp>
+        <p:nvSpPr>
+          <p:cNvPr id="3" name="TextBox 2">
+            <a:extLst>
+              <a:ext uri="{FF2B5EF4-FFF2-40B4-BE49-F238E27FC236}">
+                <a16:creationId xmlns:a16="http://schemas.microsoft.com/office/drawing/2014/main" id="{FCD3331A-9AAE-0443-99B5-8ED020E0837A}"/>
+              </a:ext>
+            </a:extLst>
+          </p:cNvPr>
+          <p:cNvSpPr txBox="1"/>
+          <p:nvPr/>
+        </p:nvSpPr>
+        <p:spPr>
+          <a:xfrm>
+            <a:off x="486696" y="929148"/>
+            <a:ext cx="15308827" cy="4093428"/>
+          </a:xfrm>
+          <a:prstGeom prst="rect">
+            <a:avLst/>
+          </a:prstGeom>
+          <a:noFill/>
+        </p:spPr>
+        <p:txBody>
+          <a:bodyPr wrap="square" rtlCol="0">
+            <a:spAutoFit/>
+          </a:bodyPr>
+          <a:lstStyle/>
+          <a:p>
+            <a:pPr marL="457200" indent="-457200">
+              <a:buFont typeface="Arial" panose="020B0604020202020204" pitchFamily="34" charset="0"/>
+              <a:buChar char="•"/>
+            </a:pPr>
+            <a:r>
+              <a:rPr lang="nl-NL" sz="2000" dirty="0" err="1"/>
+              <a:t>Our</a:t>
+            </a:r>
+            <a:r>
+              <a:rPr lang="nl-NL" sz="2000" dirty="0"/>
+              <a:t> team name on </a:t>
+            </a:r>
+            <a:r>
+              <a:rPr lang="nl-NL" sz="2000" dirty="0" err="1"/>
+              <a:t>Kaggle</a:t>
+            </a:r>
+            <a:r>
+              <a:rPr lang="nl-NL" sz="2000" dirty="0"/>
+              <a:t> is </a:t>
+            </a:r>
+            <a:r>
+              <a:rPr lang="nl-NL" sz="2000" dirty="0" err="1"/>
+              <a:t>MLiP_Badger</a:t>
+            </a:r>
+            <a:endParaRPr lang="nl-NL" sz="2000" dirty="0"/>
+          </a:p>
+          <a:p>
+            <a:pPr marL="457200" indent="-457200">
+              <a:buFont typeface="Arial" panose="020B0604020202020204" pitchFamily="34" charset="0"/>
+              <a:buChar char="•"/>
+            </a:pPr>
+            <a:r>
+              <a:rPr lang="nl-NL" sz="2000" dirty="0"/>
+              <a:t>We made </a:t>
+            </a:r>
+            <a:r>
+              <a:rPr lang="nl-NL" sz="2000" dirty="0" err="1"/>
+              <a:t>one</a:t>
+            </a:r>
+            <a:r>
+              <a:rPr lang="nl-NL" sz="2000" dirty="0"/>
+              <a:t> </a:t>
+            </a:r>
+            <a:r>
+              <a:rPr lang="nl-NL" sz="2000" dirty="0" err="1"/>
+              <a:t>submission</a:t>
+            </a:r>
+            <a:r>
+              <a:rPr lang="nl-NL" sz="2000" dirty="0"/>
+              <a:t> </a:t>
+            </a:r>
+            <a:r>
+              <a:rPr lang="nl-NL" sz="2000" dirty="0" err="1"/>
+              <a:t>with</a:t>
+            </a:r>
+            <a:r>
+              <a:rPr lang="nl-NL" sz="2000" dirty="0"/>
+              <a:t> </a:t>
+            </a:r>
+            <a:r>
+              <a:rPr lang="nl-NL" sz="2000" dirty="0" err="1"/>
+              <a:t>the</a:t>
+            </a:r>
+            <a:r>
+              <a:rPr lang="nl-NL" sz="2000" dirty="0"/>
+              <a:t> </a:t>
+            </a:r>
+            <a:r>
+              <a:rPr lang="nl-NL" sz="2000" dirty="0" err="1"/>
+              <a:t>predition</a:t>
+            </a:r>
+            <a:r>
+              <a:rPr lang="nl-NL" sz="2000" dirty="0"/>
+              <a:t> made </a:t>
+            </a:r>
+            <a:r>
+              <a:rPr lang="nl-NL" sz="2000" dirty="0" err="1"/>
+              <a:t>with</a:t>
+            </a:r>
+            <a:r>
+              <a:rPr lang="nl-NL" sz="2000" dirty="0"/>
+              <a:t> ARIMA model. We </a:t>
+            </a:r>
+            <a:r>
+              <a:rPr lang="nl-NL" sz="2000" dirty="0" err="1"/>
+              <a:t>used</a:t>
+            </a:r>
+            <a:r>
+              <a:rPr lang="nl-NL" sz="2000" dirty="0"/>
+              <a:t> </a:t>
+            </a:r>
+            <a:r>
+              <a:rPr lang="nl-NL" sz="2000" dirty="0" err="1"/>
+              <a:t>implementation</a:t>
+            </a:r>
+            <a:r>
+              <a:rPr lang="nl-NL" sz="2000" dirty="0"/>
+              <a:t> </a:t>
+            </a:r>
+            <a:r>
+              <a:rPr lang="nl-NL" sz="2000" dirty="0" err="1"/>
+              <a:t>from</a:t>
+            </a:r>
+            <a:r>
+              <a:rPr lang="nl-NL" sz="2000" dirty="0"/>
+              <a:t> </a:t>
+            </a:r>
+            <a:r>
+              <a:rPr lang="en-US" sz="2000" dirty="0">
+                <a:hlinkClick r:id="rId2"/>
+              </a:rPr>
+              <a:t>statsmodels</a:t>
+            </a:r>
+            <a:r>
+              <a:rPr lang="en-US" sz="2000" dirty="0"/>
+              <a:t> Python module – SARIMAX function</a:t>
+            </a:r>
+          </a:p>
+          <a:p>
+            <a:pPr marL="457200" indent="-457200">
+              <a:buFont typeface="Arial" panose="020B0604020202020204" pitchFamily="34" charset="0"/>
+              <a:buChar char="•"/>
+            </a:pPr>
+            <a:r>
+              <a:rPr lang="nl-NL" sz="2000" dirty="0"/>
+              <a:t>We </a:t>
+            </a:r>
+            <a:r>
+              <a:rPr lang="nl-NL" sz="2000" dirty="0" err="1"/>
+              <a:t>decided</a:t>
+            </a:r>
+            <a:r>
+              <a:rPr lang="nl-NL" sz="2000" dirty="0"/>
+              <a:t> </a:t>
+            </a:r>
+            <a:r>
+              <a:rPr lang="nl-NL" sz="2000" dirty="0" err="1"/>
+              <a:t>to</a:t>
+            </a:r>
+            <a:r>
+              <a:rPr lang="nl-NL" sz="2000" dirty="0"/>
+              <a:t> experiment </a:t>
+            </a:r>
+            <a:r>
+              <a:rPr lang="nl-NL" sz="2000" dirty="0" err="1"/>
+              <a:t>with</a:t>
+            </a:r>
+            <a:r>
+              <a:rPr lang="nl-NL" sz="2000" dirty="0"/>
+              <a:t> </a:t>
+            </a:r>
+            <a:r>
+              <a:rPr lang="nl-NL" sz="2000" dirty="0" err="1"/>
+              <a:t>this</a:t>
+            </a:r>
+            <a:r>
+              <a:rPr lang="nl-NL" sz="2000" dirty="0"/>
+              <a:t> model </a:t>
+            </a:r>
+            <a:r>
+              <a:rPr lang="nl-NL" sz="2000" dirty="0" err="1"/>
+              <a:t>because</a:t>
+            </a:r>
+            <a:r>
+              <a:rPr lang="nl-NL" sz="2000" dirty="0"/>
+              <a:t> (</a:t>
+            </a:r>
+            <a:r>
+              <a:rPr lang="nl-NL" sz="2000" dirty="0" err="1"/>
+              <a:t>why</a:t>
+            </a:r>
+            <a:r>
+              <a:rPr lang="nl-NL" sz="2000" dirty="0"/>
+              <a:t>? As far as I </a:t>
+            </a:r>
+            <a:r>
+              <a:rPr lang="nl-NL" sz="2000" dirty="0" err="1"/>
+              <a:t>can</a:t>
+            </a:r>
+            <a:r>
+              <a:rPr lang="nl-NL" sz="2000" dirty="0"/>
+              <a:t> </a:t>
+            </a:r>
+            <a:r>
+              <a:rPr lang="nl-NL" sz="2000" dirty="0" err="1"/>
+              <a:t>see</a:t>
+            </a:r>
+            <a:r>
+              <a:rPr lang="nl-NL" sz="2000" dirty="0"/>
+              <a:t> </a:t>
+            </a:r>
+            <a:r>
+              <a:rPr lang="nl-NL" sz="2000" dirty="0" err="1"/>
+              <a:t>now</a:t>
+            </a:r>
+            <a:r>
+              <a:rPr lang="nl-NL" sz="2000" dirty="0"/>
+              <a:t> </a:t>
+            </a:r>
+            <a:r>
+              <a:rPr lang="nl-NL" sz="2000" dirty="0" err="1"/>
+              <a:t>the</a:t>
+            </a:r>
+            <a:r>
+              <a:rPr lang="nl-NL" sz="2000" dirty="0"/>
+              <a:t> </a:t>
+            </a:r>
+            <a:r>
+              <a:rPr lang="nl-NL" sz="2000" dirty="0" err="1"/>
+              <a:t>used</a:t>
+            </a:r>
+            <a:r>
+              <a:rPr lang="nl-NL" sz="2000" dirty="0"/>
+              <a:t> </a:t>
+            </a:r>
+            <a:r>
+              <a:rPr lang="nl-NL" sz="2000" dirty="0" err="1"/>
+              <a:t>implementation</a:t>
+            </a:r>
+            <a:r>
+              <a:rPr lang="nl-NL" sz="2000" dirty="0"/>
+              <a:t> </a:t>
+            </a:r>
+            <a:r>
+              <a:rPr lang="nl-NL" sz="2000" dirty="0" err="1"/>
+              <a:t>allows</a:t>
+            </a:r>
+            <a:r>
+              <a:rPr lang="nl-NL" sz="2000" dirty="0"/>
+              <a:t> </a:t>
+            </a:r>
+            <a:r>
+              <a:rPr lang="nl-NL" sz="2000" dirty="0" err="1"/>
+              <a:t>to</a:t>
+            </a:r>
+            <a:r>
+              <a:rPr lang="nl-NL" sz="2000" dirty="0"/>
+              <a:t> </a:t>
+            </a:r>
+            <a:r>
+              <a:rPr lang="nl-NL" sz="2000" dirty="0" err="1"/>
+              <a:t>try</a:t>
+            </a:r>
+            <a:r>
+              <a:rPr lang="nl-NL" sz="2000" dirty="0"/>
+              <a:t> different options: ARIMA, ARIMAX, SARIMAX, </a:t>
+            </a:r>
+            <a:r>
+              <a:rPr lang="nl-NL" sz="2000" dirty="0" err="1"/>
+              <a:t>this</a:t>
+            </a:r>
+            <a:r>
+              <a:rPr lang="nl-NL" sz="2000" dirty="0"/>
+              <a:t> </a:t>
+            </a:r>
+            <a:r>
+              <a:rPr lang="nl-NL" sz="2000" dirty="0" err="1"/>
+              <a:t>could</a:t>
+            </a:r>
+            <a:r>
+              <a:rPr lang="nl-NL" sz="2000" dirty="0"/>
+              <a:t> </a:t>
+            </a:r>
+            <a:r>
+              <a:rPr lang="nl-NL" sz="2000" dirty="0" err="1"/>
+              <a:t>be</a:t>
+            </a:r>
+            <a:r>
+              <a:rPr lang="nl-NL" sz="2000" dirty="0"/>
+              <a:t> </a:t>
+            </a:r>
+            <a:r>
+              <a:rPr lang="nl-NL" sz="2000" dirty="0" err="1"/>
+              <a:t>an</a:t>
+            </a:r>
+            <a:r>
+              <a:rPr lang="nl-NL" sz="2000" dirty="0"/>
+              <a:t> argument)</a:t>
+            </a:r>
+          </a:p>
+          <a:p>
+            <a:pPr marL="457200" indent="-457200">
+              <a:buFont typeface="Arial" panose="020B0604020202020204" pitchFamily="34" charset="0"/>
+              <a:buChar char="•"/>
+            </a:pPr>
+            <a:r>
+              <a:rPr lang="ru-RU" sz="2000" dirty="0"/>
+              <a:t>70 (?) </a:t>
+            </a:r>
+            <a:r>
+              <a:rPr lang="en-US" sz="2000" dirty="0"/>
+              <a:t>last samples are used as training data</a:t>
+            </a:r>
+          </a:p>
+          <a:p>
+            <a:pPr marL="457200" indent="-457200">
+              <a:buFont typeface="Arial" panose="020B0604020202020204" pitchFamily="34" charset="0"/>
+              <a:buChar char="•"/>
+            </a:pPr>
+            <a:r>
+              <a:rPr lang="nl-NL" sz="2000" dirty="0"/>
+              <a:t>Public score </a:t>
+            </a:r>
+            <a:r>
+              <a:rPr lang="ru-RU" sz="2000" dirty="0"/>
+              <a:t>1.08216</a:t>
+            </a:r>
+            <a:endParaRPr lang="en-US" sz="2000" dirty="0"/>
+          </a:p>
+          <a:p>
+            <a:pPr marL="457200" indent="-457200">
+              <a:buFont typeface="Arial" panose="020B0604020202020204" pitchFamily="34" charset="0"/>
+              <a:buChar char="•"/>
+            </a:pPr>
+            <a:r>
+              <a:rPr lang="en-US" sz="2000" dirty="0"/>
+              <a:t>This helped to figure our how default Kaggle submission works (not from a notebook). Submission was made via Kaggle </a:t>
+            </a:r>
+            <a:r>
+              <a:rPr lang="en-US" sz="2000" dirty="0" err="1"/>
+              <a:t>api</a:t>
+            </a:r>
+            <a:endParaRPr lang="nl-NL" sz="2000" dirty="0"/>
+          </a:p>
+          <a:p>
+            <a:pPr marL="457200" indent="-457200">
+              <a:buFont typeface="Arial" panose="020B0604020202020204" pitchFamily="34" charset="0"/>
+              <a:buChar char="•"/>
+            </a:pPr>
+            <a:endParaRPr lang="en-US" sz="2000" dirty="0"/>
+          </a:p>
+          <a:p>
+            <a:pPr marL="457200" indent="-457200">
+              <a:buFont typeface="Arial" panose="020B0604020202020204" pitchFamily="34" charset="0"/>
+              <a:buChar char="•"/>
+            </a:pPr>
+            <a:endParaRPr lang="nl-NL" sz="2000" dirty="0"/>
+          </a:p>
+          <a:p>
+            <a:pPr marL="457200" indent="-457200">
+              <a:buFont typeface="Arial" panose="020B0604020202020204" pitchFamily="34" charset="0"/>
+              <a:buChar char="•"/>
+            </a:pPr>
+            <a:endParaRPr lang="nl-NL" sz="2000" dirty="0"/>
+          </a:p>
+          <a:p>
+            <a:pPr marL="457200" indent="-457200">
+              <a:buFont typeface="Arial" panose="020B0604020202020204" pitchFamily="34" charset="0"/>
+              <a:buChar char="•"/>
+            </a:pPr>
+            <a:endParaRPr lang="nl-NL" sz="2000" dirty="0"/>
+          </a:p>
+          <a:p>
+            <a:pPr marL="457200" indent="-457200">
+              <a:buFont typeface="Arial" panose="020B0604020202020204" pitchFamily="34" charset="0"/>
+              <a:buChar char="•"/>
+            </a:pPr>
+            <a:endParaRPr lang="ru-RU" sz="2000" dirty="0">
               <a:latin typeface="+mn-lt"/>
             </a:endParaRPr>
           </a:p>

</xml_diff>